<commit_message>
Finished section on the relative layout designer
</commit_message>
<xml_diff>
--- a/Slides/Wk4Day1-UI Layouts and Orientation.pptx
+++ b/Slides/Wk4Day1-UI Layouts and Orientation.pptx
@@ -5,7 +5,7 @@
     <p:sldMasterId id="2147483797" r:id="rId1"/>
   </p:sldMasterIdLst>
   <p:notesMasterIdLst>
-    <p:notesMasterId r:id="rId21"/>
+    <p:notesMasterId r:id="rId22"/>
   </p:notesMasterIdLst>
   <p:sldIdLst>
     <p:sldId id="256" r:id="rId2"/>
@@ -22,11 +22,12 @@
     <p:sldId id="269" r:id="rId13"/>
     <p:sldId id="270" r:id="rId14"/>
     <p:sldId id="282" r:id="rId15"/>
-    <p:sldId id="280" r:id="rId16"/>
-    <p:sldId id="281" r:id="rId17"/>
-    <p:sldId id="277" r:id="rId18"/>
-    <p:sldId id="271" r:id="rId19"/>
-    <p:sldId id="278" r:id="rId20"/>
+    <p:sldId id="283" r:id="rId16"/>
+    <p:sldId id="280" r:id="rId17"/>
+    <p:sldId id="281" r:id="rId18"/>
+    <p:sldId id="277" r:id="rId19"/>
+    <p:sldId id="271" r:id="rId20"/>
+    <p:sldId id="278" r:id="rId21"/>
   </p:sldIdLst>
   <p:sldSz cx="9144000" cy="6858000" type="screen4x3"/>
   <p:notesSz cx="6858000" cy="9144000"/>
@@ -148,6 +149,7 @@
             <p14:sldId id="269"/>
             <p14:sldId id="270"/>
             <p14:sldId id="282"/>
+            <p14:sldId id="283"/>
             <p14:sldId id="280"/>
             <p14:sldId id="281"/>
             <p14:sldId id="277"/>
@@ -1213,7 +1215,7 @@
     </p:spTree>
     <p:extLst>
       <p:ext uri="{BB962C8B-B14F-4D97-AF65-F5344CB8AC3E}">
-        <p14:creationId xmlns:p14="http://schemas.microsoft.com/office/powerpoint/2010/main" val="2078751417"/>
+        <p14:creationId xmlns:p14="http://schemas.microsoft.com/office/powerpoint/2010/main" val="3449978499"/>
       </p:ext>
     </p:extLst>
   </p:cSld>
@@ -1332,6 +1334,133 @@
             <a:fld id="{E94675F0-C2CB-0246-91F1-0967C899A5BC}" type="slidenum">
               <a:rPr lang="en-US" smtClean="0"/>
               <a:t>16</a:t>
+            </a:fld>
+            <a:endParaRPr lang="en-US"/>
+          </a:p>
+        </p:txBody>
+      </p:sp>
+    </p:spTree>
+    <p:extLst>
+      <p:ext uri="{BB962C8B-B14F-4D97-AF65-F5344CB8AC3E}">
+        <p14:creationId xmlns:p14="http://schemas.microsoft.com/office/powerpoint/2010/main" val="2078751417"/>
+      </p:ext>
+    </p:extLst>
+  </p:cSld>
+  <p:clrMapOvr>
+    <a:masterClrMapping/>
+  </p:clrMapOvr>
+</p:notes>
+</file>
+
+<file path=ppt/notesSlides/notesSlide6.xml><?xml version="1.0" encoding="utf-8"?>
+<p:notes xmlns:a="http://schemas.openxmlformats.org/drawingml/2006/main" xmlns:r="http://schemas.openxmlformats.org/officeDocument/2006/relationships" xmlns:p="http://schemas.openxmlformats.org/presentationml/2006/main">
+  <p:cSld>
+    <p:spTree>
+      <p:nvGrpSpPr>
+        <p:cNvPr id="1" name=""/>
+        <p:cNvGrpSpPr/>
+        <p:nvPr/>
+      </p:nvGrpSpPr>
+      <p:grpSpPr>
+        <a:xfrm>
+          <a:off x="0" y="0"/>
+          <a:ext cx="0" cy="0"/>
+          <a:chOff x="0" y="0"/>
+          <a:chExt cx="0" cy="0"/>
+        </a:xfrm>
+      </p:grpSpPr>
+      <p:sp>
+        <p:nvSpPr>
+          <p:cNvPr id="2" name="Slide Image Placeholder 1"/>
+          <p:cNvSpPr>
+            <a:spLocks noGrp="1" noRot="1" noChangeAspect="1"/>
+          </p:cNvSpPr>
+          <p:nvPr>
+            <p:ph type="sldImg"/>
+          </p:nvPr>
+        </p:nvSpPr>
+        <p:spPr/>
+      </p:sp>
+      <p:sp>
+        <p:nvSpPr>
+          <p:cNvPr id="3" name="Notes Placeholder 2"/>
+          <p:cNvSpPr>
+            <a:spLocks noGrp="1"/>
+          </p:cNvSpPr>
+          <p:nvPr>
+            <p:ph type="body" idx="1"/>
+          </p:nvPr>
+        </p:nvSpPr>
+        <p:spPr/>
+        <p:txBody>
+          <a:bodyPr/>
+          <a:lstStyle/>
+          <a:p>
+            <a:r>
+              <a:rPr lang="en-US" dirty="0"/>
+              <a:t>https://</a:t>
+            </a:r>
+            <a:r>
+              <a:rPr lang="en-US" dirty="0" err="1"/>
+              <a:t>docs.microsoft.com</a:t>
+            </a:r>
+            <a:r>
+              <a:rPr lang="en-US" dirty="0"/>
+              <a:t>/</a:t>
+            </a:r>
+            <a:r>
+              <a:rPr lang="en-US" dirty="0" err="1"/>
+              <a:t>en</a:t>
+            </a:r>
+            <a:r>
+              <a:rPr lang="en-US" dirty="0"/>
+              <a:t>-us/</a:t>
+            </a:r>
+            <a:r>
+              <a:rPr lang="en-US" dirty="0" err="1"/>
+              <a:t>xamarin</a:t>
+            </a:r>
+            <a:r>
+              <a:rPr lang="en-US" dirty="0"/>
+              <a:t>/android/user-interface/android-designer/</a:t>
+            </a:r>
+            <a:r>
+              <a:rPr lang="en-US" dirty="0" err="1"/>
+              <a:t>designer-basics?tabs</a:t>
+            </a:r>
+            <a:r>
+              <a:rPr lang="en-US" dirty="0"/>
+              <a:t>=</a:t>
+            </a:r>
+            <a:r>
+              <a:rPr lang="en-US" dirty="0" err="1"/>
+              <a:t>vswin#margin</a:t>
+            </a:r>
+            <a:endParaRPr lang="en-US" dirty="0"/>
+          </a:p>
+          <a:p>
+            <a:endParaRPr lang="en-US" dirty="0"/>
+          </a:p>
+        </p:txBody>
+      </p:sp>
+      <p:sp>
+        <p:nvSpPr>
+          <p:cNvPr id="4" name="Slide Number Placeholder 3"/>
+          <p:cNvSpPr>
+            <a:spLocks noGrp="1"/>
+          </p:cNvSpPr>
+          <p:nvPr>
+            <p:ph type="sldNum" sz="quarter" idx="5"/>
+          </p:nvPr>
+        </p:nvSpPr>
+        <p:spPr/>
+        <p:txBody>
+          <a:bodyPr/>
+          <a:lstStyle/>
+          <a:p>
+            <a:fld id="{E94675F0-C2CB-0246-91F1-0967C899A5BC}" type="slidenum">
+              <a:rPr lang="en-US" smtClean="0"/>
+              <a:t>17</a:t>
             </a:fld>
             <a:endParaRPr lang="en-US"/>
           </a:p>
@@ -5120,7 +5249,114 @@
           <a:p>
             <a:r>
               <a:rPr lang="en-US" sz="4400" dirty="0"/>
-              <a:t>Layout Designer – Relative Layout</a:t>
+              <a:t>Layout Designer – Position</a:t>
+            </a:r>
+          </a:p>
+        </p:txBody>
+      </p:sp>
+      <p:sp>
+        <p:nvSpPr>
+          <p:cNvPr id="3" name="Content Placeholder 2">
+            <a:extLst>
+              <a:ext uri="{FF2B5EF4-FFF2-40B4-BE49-F238E27FC236}">
+                <a16:creationId xmlns:a16="http://schemas.microsoft.com/office/drawing/2014/main" id="{D5BED8D4-AF0C-634E-89E3-1AABB488A33A}"/>
+              </a:ext>
+            </a:extLst>
+          </p:cNvPr>
+          <p:cNvSpPr>
+            <a:spLocks noGrp="1"/>
+          </p:cNvSpPr>
+          <p:nvPr>
+            <p:ph idx="1"/>
+          </p:nvPr>
+        </p:nvSpPr>
+        <p:spPr>
+          <a:xfrm>
+            <a:off x="457200" y="1600200"/>
+            <a:ext cx="8229600" cy="2043545"/>
+          </a:xfrm>
+        </p:spPr>
+        <p:txBody>
+          <a:bodyPr>
+            <a:normAutofit fontScale="77500" lnSpcReduction="20000"/>
+          </a:bodyPr>
+          <a:lstStyle/>
+          <a:p>
+            <a:pPr marL="0" indent="0">
+              <a:buNone/>
+            </a:pPr>
+            <a:r>
+              <a:rPr lang="en-US" b="1" dirty="0"/>
+              <a:t>Position relative to other widgets</a:t>
+            </a:r>
+          </a:p>
+          <a:p>
+            <a:r>
+              <a:rPr lang="en-US" dirty="0"/>
+              <a:t>When you first drag a widget out of the toolbox, drop it so that it touches the widget that you want it to be below</a:t>
+            </a:r>
+          </a:p>
+          <a:p>
+            <a:endParaRPr lang="en-US" dirty="0"/>
+          </a:p>
+        </p:txBody>
+      </p:sp>
+    </p:spTree>
+    <p:extLst>
+      <p:ext uri="{BB962C8B-B14F-4D97-AF65-F5344CB8AC3E}">
+        <p14:creationId xmlns:p14="http://schemas.microsoft.com/office/powerpoint/2010/main" val="1360710951"/>
+      </p:ext>
+    </p:extLst>
+  </p:cSld>
+  <p:clrMapOvr>
+    <a:masterClrMapping/>
+  </p:clrMapOvr>
+</p:sld>
+</file>
+
+<file path=ppt/slides/slide15.xml><?xml version="1.0" encoding="utf-8"?>
+<p:sld xmlns:a="http://schemas.openxmlformats.org/drawingml/2006/main" xmlns:r="http://schemas.openxmlformats.org/officeDocument/2006/relationships" xmlns:p="http://schemas.openxmlformats.org/presentationml/2006/main">
+  <p:cSld>
+    <p:spTree>
+      <p:nvGrpSpPr>
+        <p:cNvPr id="1" name=""/>
+        <p:cNvGrpSpPr/>
+        <p:nvPr/>
+      </p:nvGrpSpPr>
+      <p:grpSpPr>
+        <a:xfrm>
+          <a:off x="0" y="0"/>
+          <a:ext cx="0" cy="0"/>
+          <a:chOff x="0" y="0"/>
+          <a:chExt cx="0" cy="0"/>
+        </a:xfrm>
+      </p:grpSpPr>
+      <p:sp>
+        <p:nvSpPr>
+          <p:cNvPr id="2" name="Title 1">
+            <a:extLst>
+              <a:ext uri="{FF2B5EF4-FFF2-40B4-BE49-F238E27FC236}">
+                <a16:creationId xmlns:a16="http://schemas.microsoft.com/office/drawing/2014/main" id="{80BB211D-5E74-9C47-A166-9B48B5DB6A69}"/>
+              </a:ext>
+            </a:extLst>
+          </p:cNvPr>
+          <p:cNvSpPr>
+            <a:spLocks noGrp="1"/>
+          </p:cNvSpPr>
+          <p:nvPr>
+            <p:ph type="title"/>
+          </p:nvPr>
+        </p:nvSpPr>
+        <p:spPr/>
+        <p:txBody>
+          <a:bodyPr>
+            <a:noAutofit/>
+          </a:bodyPr>
+          <a:lstStyle/>
+          <a:p>
+            <a:r>
+              <a:rPr lang="en-US" sz="4400" dirty="0"/>
+              <a:t>Layout Designer – Size</a:t>
             </a:r>
           </a:p>
         </p:txBody>
@@ -5223,7 +5459,7 @@
     </p:spTree>
     <p:extLst>
       <p:ext uri="{BB962C8B-B14F-4D97-AF65-F5344CB8AC3E}">
-        <p14:creationId xmlns:p14="http://schemas.microsoft.com/office/powerpoint/2010/main" val="1360710951"/>
+        <p14:creationId xmlns:p14="http://schemas.microsoft.com/office/powerpoint/2010/main" val="3353438181"/>
       </p:ext>
     </p:extLst>
   </p:cSld>
@@ -5233,7 +5469,7 @@
 </p:sld>
 </file>
 
-<file path=ppt/slides/slide15.xml><?xml version="1.0" encoding="utf-8"?>
+<file path=ppt/slides/slide16.xml><?xml version="1.0" encoding="utf-8"?>
 <p:sld xmlns:a="http://schemas.openxmlformats.org/drawingml/2006/main" xmlns:r="http://schemas.openxmlformats.org/officeDocument/2006/relationships" xmlns:p="http://schemas.openxmlformats.org/presentationml/2006/main">
   <p:cSld>
     <p:spTree>
@@ -5275,7 +5511,7 @@
           <a:p>
             <a:r>
               <a:rPr lang="en-US" sz="4400" dirty="0"/>
-              <a:t>Layout Designer – Relative Layout</a:t>
+              <a:t>Layout Designer – Margins</a:t>
             </a:r>
           </a:p>
         </p:txBody>
@@ -5376,7 +5612,7 @@
 </p:sld>
 </file>
 
-<file path=ppt/slides/slide16.xml><?xml version="1.0" encoding="utf-8"?>
+<file path=ppt/slides/slide17.xml><?xml version="1.0" encoding="utf-8"?>
 <p:sld xmlns:a="http://schemas.openxmlformats.org/drawingml/2006/main" xmlns:r="http://schemas.openxmlformats.org/officeDocument/2006/relationships" xmlns:p="http://schemas.openxmlformats.org/presentationml/2006/main">
   <p:cSld>
     <p:spTree>
@@ -5418,7 +5654,7 @@
           <a:p>
             <a:r>
               <a:rPr lang="en-US" sz="4400" dirty="0"/>
-              <a:t>Layout Designer – Relative Layout</a:t>
+              <a:t>Layout Designer – Alignment</a:t>
             </a:r>
           </a:p>
         </p:txBody>
@@ -5456,25 +5692,19 @@
             </a:pPr>
             <a:r>
               <a:rPr lang="en-US" b="1" dirty="0"/>
-              <a:t>Adjusting  Position</a:t>
-            </a:r>
-          </a:p>
-          <a:p>
-            <a:r>
-              <a:rPr lang="en-US" dirty="0"/>
-              <a:t>The third time you click a widget, position handles appear</a:t>
-            </a:r>
-          </a:p>
-          <a:p>
-            <a:r>
-              <a:rPr lang="en-US" dirty="0"/>
-              <a:t>Drag a handle to another widget to set it’s relative position</a:t>
-            </a:r>
-          </a:p>
-          <a:p>
-            <a:r>
-              <a:rPr lang="en-US" dirty="0"/>
-              <a:t>Click on the arrow handles to fill the parent in that direction</a:t>
+              <a:t>Aligning Position</a:t>
+            </a:r>
+          </a:p>
+          <a:p>
+            <a:r>
+              <a:rPr lang="en-US" dirty="0"/>
+              <a:t>The third time you click a widget, alignment handles appear</a:t>
+            </a:r>
+          </a:p>
+          <a:p>
+            <a:r>
+              <a:rPr lang="en-US" dirty="0"/>
+              <a:t>Drag a handle to an edge of another widget to align it’s relative position</a:t>
             </a:r>
           </a:p>
           <a:p>
@@ -5531,7 +5761,7 @@
 </p:sld>
 </file>
 
-<file path=ppt/slides/slide17.xml><?xml version="1.0" encoding="utf-8"?>
+<file path=ppt/slides/slide18.xml><?xml version="1.0" encoding="utf-8"?>
 <p:sld xmlns:a="http://schemas.openxmlformats.org/drawingml/2006/main" xmlns:r="http://schemas.openxmlformats.org/officeDocument/2006/relationships" xmlns:p="http://schemas.openxmlformats.org/presentationml/2006/main">
   <p:cSld>
     <p:spTree>
@@ -5638,7 +5868,7 @@
 </p:sld>
 </file>
 
-<file path=ppt/slides/slide18.xml><?xml version="1.0" encoding="utf-8"?>
+<file path=ppt/slides/slide19.xml><?xml version="1.0" encoding="utf-8"?>
 <p:sld xmlns:a="http://schemas.openxmlformats.org/drawingml/2006/main" xmlns:r="http://schemas.openxmlformats.org/officeDocument/2006/relationships" xmlns:p="http://schemas.openxmlformats.org/presentationml/2006/main">
   <p:cSld>
     <p:spTree>
@@ -5778,149 +6008,6 @@
     <p:extLst>
       <p:ext uri="{BB962C8B-B14F-4D97-AF65-F5344CB8AC3E}">
         <p14:creationId xmlns:p14="http://schemas.microsoft.com/office/powerpoint/2010/main" val="1360863398"/>
-      </p:ext>
-    </p:extLst>
-  </p:cSld>
-  <p:clrMapOvr>
-    <a:masterClrMapping/>
-  </p:clrMapOvr>
-</p:sld>
-</file>
-
-<file path=ppt/slides/slide19.xml><?xml version="1.0" encoding="utf-8"?>
-<p:sld xmlns:a="http://schemas.openxmlformats.org/drawingml/2006/main" xmlns:r="http://schemas.openxmlformats.org/officeDocument/2006/relationships" xmlns:p="http://schemas.openxmlformats.org/presentationml/2006/main">
-  <p:cSld>
-    <p:spTree>
-      <p:nvGrpSpPr>
-        <p:cNvPr id="1" name=""/>
-        <p:cNvGrpSpPr/>
-        <p:nvPr/>
-      </p:nvGrpSpPr>
-      <p:grpSpPr>
-        <a:xfrm>
-          <a:off x="0" y="0"/>
-          <a:ext cx="0" cy="0"/>
-          <a:chOff x="0" y="0"/>
-          <a:chExt cx="0" cy="0"/>
-        </a:xfrm>
-      </p:grpSpPr>
-      <p:sp>
-        <p:nvSpPr>
-          <p:cNvPr id="2" name="Title 1"/>
-          <p:cNvSpPr>
-            <a:spLocks noGrp="1"/>
-          </p:cNvSpPr>
-          <p:nvPr>
-            <p:ph type="title"/>
-          </p:nvPr>
-        </p:nvSpPr>
-        <p:spPr>
-          <a:xfrm>
-            <a:off x="457200" y="457200"/>
-            <a:ext cx="8229600" cy="957943"/>
-          </a:xfrm>
-        </p:spPr>
-        <p:txBody>
-          <a:bodyPr/>
-          <a:lstStyle/>
-          <a:p>
-            <a:r>
-              <a:rPr lang="en-US" dirty="0"/>
-              <a:t>Location of the XML Files</a:t>
-            </a:r>
-          </a:p>
-        </p:txBody>
-      </p:sp>
-      <p:sp>
-        <p:nvSpPr>
-          <p:cNvPr id="3" name="Content Placeholder 2"/>
-          <p:cNvSpPr>
-            <a:spLocks noGrp="1"/>
-          </p:cNvSpPr>
-          <p:nvPr>
-            <p:ph idx="1"/>
-          </p:nvPr>
-        </p:nvSpPr>
-        <p:spPr>
-          <a:xfrm>
-            <a:off x="457200" y="2166258"/>
-            <a:ext cx="8229600" cy="3959906"/>
-          </a:xfrm>
-        </p:spPr>
-        <p:txBody>
-          <a:bodyPr>
-            <a:normAutofit/>
-          </a:bodyPr>
-          <a:lstStyle/>
-          <a:p>
-            <a:r>
-              <a:rPr lang="en-US" b="1" dirty="0"/>
-              <a:t>Portrait</a:t>
-            </a:r>
-            <a:br>
-              <a:rPr lang="en-US" b="1" dirty="0"/>
-            </a:br>
-            <a:r>
-              <a:rPr lang="en-US" dirty="0"/>
-              <a:t>Resources/</a:t>
-            </a:r>
-            <a:r>
-              <a:rPr lang="en-US" dirty="0">
-                <a:solidFill>
-                  <a:srgbClr val="0070C0"/>
-                </a:solidFill>
-              </a:rPr>
-              <a:t>layout</a:t>
-            </a:r>
-            <a:r>
-              <a:rPr lang="en-US" dirty="0"/>
-              <a:t>/</a:t>
-            </a:r>
-            <a:r>
-              <a:rPr lang="en-US" dirty="0" err="1"/>
-              <a:t>activity_main.xml</a:t>
-            </a:r>
-            <a:endParaRPr lang="en-US" dirty="0"/>
-          </a:p>
-          <a:p>
-            <a:r>
-              <a:rPr lang="en-US" b="1" dirty="0"/>
-              <a:t>Landscape</a:t>
-            </a:r>
-            <a:br>
-              <a:rPr lang="en-US" b="1" dirty="0"/>
-            </a:br>
-            <a:r>
-              <a:rPr lang="en-US" dirty="0"/>
-              <a:t>Resources/</a:t>
-            </a:r>
-            <a:r>
-              <a:rPr lang="en-US" dirty="0">
-                <a:solidFill>
-                  <a:srgbClr val="0070C0"/>
-                </a:solidFill>
-              </a:rPr>
-              <a:t>layout-land</a:t>
-            </a:r>
-            <a:r>
-              <a:rPr lang="en-US" dirty="0"/>
-              <a:t>/</a:t>
-            </a:r>
-            <a:r>
-              <a:rPr lang="en-US" dirty="0" err="1"/>
-              <a:t>activity_main.xml</a:t>
-            </a:r>
-            <a:endParaRPr lang="en-US" dirty="0"/>
-          </a:p>
-          <a:p>
-            <a:endParaRPr lang="en-US" dirty="0"/>
-          </a:p>
-        </p:txBody>
-      </p:sp>
-    </p:spTree>
-    <p:extLst>
-      <p:ext uri="{BB962C8B-B14F-4D97-AF65-F5344CB8AC3E}">
-        <p14:creationId xmlns:p14="http://schemas.microsoft.com/office/powerpoint/2010/main" val="1747687140"/>
       </p:ext>
     </p:extLst>
   </p:cSld>
@@ -6708,6 +6795,149 @@
     <p:extLst>
       <p:ext uri="{BB962C8B-B14F-4D97-AF65-F5344CB8AC3E}">
         <p14:creationId xmlns:p14="http://schemas.microsoft.com/office/powerpoint/2010/main" val="1551616293"/>
+      </p:ext>
+    </p:extLst>
+  </p:cSld>
+  <p:clrMapOvr>
+    <a:masterClrMapping/>
+  </p:clrMapOvr>
+</p:sld>
+</file>
+
+<file path=ppt/slides/slide20.xml><?xml version="1.0" encoding="utf-8"?>
+<p:sld xmlns:a="http://schemas.openxmlformats.org/drawingml/2006/main" xmlns:r="http://schemas.openxmlformats.org/officeDocument/2006/relationships" xmlns:p="http://schemas.openxmlformats.org/presentationml/2006/main">
+  <p:cSld>
+    <p:spTree>
+      <p:nvGrpSpPr>
+        <p:cNvPr id="1" name=""/>
+        <p:cNvGrpSpPr/>
+        <p:nvPr/>
+      </p:nvGrpSpPr>
+      <p:grpSpPr>
+        <a:xfrm>
+          <a:off x="0" y="0"/>
+          <a:ext cx="0" cy="0"/>
+          <a:chOff x="0" y="0"/>
+          <a:chExt cx="0" cy="0"/>
+        </a:xfrm>
+      </p:grpSpPr>
+      <p:sp>
+        <p:nvSpPr>
+          <p:cNvPr id="2" name="Title 1"/>
+          <p:cNvSpPr>
+            <a:spLocks noGrp="1"/>
+          </p:cNvSpPr>
+          <p:nvPr>
+            <p:ph type="title"/>
+          </p:nvPr>
+        </p:nvSpPr>
+        <p:spPr>
+          <a:xfrm>
+            <a:off x="457200" y="457200"/>
+            <a:ext cx="8229600" cy="957943"/>
+          </a:xfrm>
+        </p:spPr>
+        <p:txBody>
+          <a:bodyPr/>
+          <a:lstStyle/>
+          <a:p>
+            <a:r>
+              <a:rPr lang="en-US" dirty="0"/>
+              <a:t>Location of the XML Files</a:t>
+            </a:r>
+          </a:p>
+        </p:txBody>
+      </p:sp>
+      <p:sp>
+        <p:nvSpPr>
+          <p:cNvPr id="3" name="Content Placeholder 2"/>
+          <p:cNvSpPr>
+            <a:spLocks noGrp="1"/>
+          </p:cNvSpPr>
+          <p:nvPr>
+            <p:ph idx="1"/>
+          </p:nvPr>
+        </p:nvSpPr>
+        <p:spPr>
+          <a:xfrm>
+            <a:off x="457200" y="2166258"/>
+            <a:ext cx="8229600" cy="3959906"/>
+          </a:xfrm>
+        </p:spPr>
+        <p:txBody>
+          <a:bodyPr>
+            <a:normAutofit/>
+          </a:bodyPr>
+          <a:lstStyle/>
+          <a:p>
+            <a:r>
+              <a:rPr lang="en-US" b="1" dirty="0"/>
+              <a:t>Portrait</a:t>
+            </a:r>
+            <a:br>
+              <a:rPr lang="en-US" b="1" dirty="0"/>
+            </a:br>
+            <a:r>
+              <a:rPr lang="en-US" dirty="0"/>
+              <a:t>Resources/</a:t>
+            </a:r>
+            <a:r>
+              <a:rPr lang="en-US" dirty="0">
+                <a:solidFill>
+                  <a:srgbClr val="0070C0"/>
+                </a:solidFill>
+              </a:rPr>
+              <a:t>layout</a:t>
+            </a:r>
+            <a:r>
+              <a:rPr lang="en-US" dirty="0"/>
+              <a:t>/</a:t>
+            </a:r>
+            <a:r>
+              <a:rPr lang="en-US" dirty="0" err="1"/>
+              <a:t>activity_main.xml</a:t>
+            </a:r>
+            <a:endParaRPr lang="en-US" dirty="0"/>
+          </a:p>
+          <a:p>
+            <a:r>
+              <a:rPr lang="en-US" b="1" dirty="0"/>
+              <a:t>Landscape</a:t>
+            </a:r>
+            <a:br>
+              <a:rPr lang="en-US" b="1" dirty="0"/>
+            </a:br>
+            <a:r>
+              <a:rPr lang="en-US" dirty="0"/>
+              <a:t>Resources/</a:t>
+            </a:r>
+            <a:r>
+              <a:rPr lang="en-US" dirty="0">
+                <a:solidFill>
+                  <a:srgbClr val="0070C0"/>
+                </a:solidFill>
+              </a:rPr>
+              <a:t>layout-land</a:t>
+            </a:r>
+            <a:r>
+              <a:rPr lang="en-US" dirty="0"/>
+              <a:t>/</a:t>
+            </a:r>
+            <a:r>
+              <a:rPr lang="en-US" dirty="0" err="1"/>
+              <a:t>activity_main.xml</a:t>
+            </a:r>
+            <a:endParaRPr lang="en-US" dirty="0"/>
+          </a:p>
+          <a:p>
+            <a:endParaRPr lang="en-US" dirty="0"/>
+          </a:p>
+        </p:txBody>
+      </p:sp>
+    </p:spTree>
+    <p:extLst>
+      <p:ext uri="{BB962C8B-B14F-4D97-AF65-F5344CB8AC3E}">
+        <p14:creationId xmlns:p14="http://schemas.microsoft.com/office/powerpoint/2010/main" val="1747687140"/>
       </p:ext>
     </p:extLst>
   </p:cSld>

</xml_diff>